<commit_message>
Add the wheel base as a const
</commit_message>
<xml_diff>
--- a/FTC/2018/Advanced FTC Code.pptx
+++ b/FTC/2018/Advanced FTC Code.pptx
@@ -16432,6 +16432,12 @@
               <a:rPr lang="fr-FR" dirty="0"/>
               <a:t> double MAX_JERK   = 100.0;</a:t>
             </a:r>
+          </a:p>
+          <a:p>
+            <a:r>
+              <a:rPr lang="en-US" dirty="0"/>
+              <a:t>const double WHEEL_BASE_WIDTH = 8;</a:t>
+            </a:r>
             <a:endParaRPr lang="en-US" sz="3000" dirty="0"/>
           </a:p>
         </p:txBody>
@@ -16756,7 +16762,7 @@
           <a:p>
             <a:r>
               <a:rPr lang="en-US" sz="3000" dirty="0"/>
-              <a:t>The lines are, left speed, right speed, heading, and other 4 fields that we don’t need to really pay attention to.</a:t>
+              <a:t>The lines are, left speed, right speed, heading, and other the x and y location of the wheels.</a:t>
             </a:r>
           </a:p>
           <a:p>

</xml_diff>